<commit_message>
partage projet VGA avec Laurent pour explication reset FIFO
</commit_message>
<xml_diff>
--- a/Projet VGA - Solution intermédiaire/Etape_Intermédiaire/Dessin.pptx
+++ b/Projet VGA - Solution intermédiaire/Etape_Intermédiaire/Dessin.pptx
@@ -7,8 +7,9 @@
   <p:sldIdLst>
     <p:sldId id="256" r:id="rId2"/>
     <p:sldId id="258" r:id="rId3"/>
-    <p:sldId id="257" r:id="rId4"/>
-    <p:sldId id="259" r:id="rId5"/>
+    <p:sldId id="260" r:id="rId4"/>
+    <p:sldId id="257" r:id="rId5"/>
+    <p:sldId id="259" r:id="rId6"/>
   </p:sldIdLst>
   <p:sldSz cx="19392900" cy="6858000"/>
   <p:notesSz cx="6858000" cy="9144000"/>
@@ -246,7 +247,7 @@
           <a:p>
             <a:fld id="{20E875BE-3CC4-4E12-96A9-BB5604419CCF}" type="datetimeFigureOut">
               <a:rPr lang="fr-FR" smtClean="0"/>
-              <a:t>13/06/2023</a:t>
+              <a:t>19/06/2023</a:t>
             </a:fld>
             <a:endParaRPr lang="fr-FR"/>
           </a:p>
@@ -416,7 +417,7 @@
           <a:p>
             <a:fld id="{20E875BE-3CC4-4E12-96A9-BB5604419CCF}" type="datetimeFigureOut">
               <a:rPr lang="fr-FR" smtClean="0"/>
-              <a:t>13/06/2023</a:t>
+              <a:t>19/06/2023</a:t>
             </a:fld>
             <a:endParaRPr lang="fr-FR"/>
           </a:p>
@@ -596,7 +597,7 @@
           <a:p>
             <a:fld id="{20E875BE-3CC4-4E12-96A9-BB5604419CCF}" type="datetimeFigureOut">
               <a:rPr lang="fr-FR" smtClean="0"/>
-              <a:t>13/06/2023</a:t>
+              <a:t>19/06/2023</a:t>
             </a:fld>
             <a:endParaRPr lang="fr-FR"/>
           </a:p>
@@ -766,7 +767,7 @@
           <a:p>
             <a:fld id="{20E875BE-3CC4-4E12-96A9-BB5604419CCF}" type="datetimeFigureOut">
               <a:rPr lang="fr-FR" smtClean="0"/>
-              <a:t>13/06/2023</a:t>
+              <a:t>19/06/2023</a:t>
             </a:fld>
             <a:endParaRPr lang="fr-FR"/>
           </a:p>
@@ -1012,7 +1013,7 @@
           <a:p>
             <a:fld id="{20E875BE-3CC4-4E12-96A9-BB5604419CCF}" type="datetimeFigureOut">
               <a:rPr lang="fr-FR" smtClean="0"/>
-              <a:t>13/06/2023</a:t>
+              <a:t>19/06/2023</a:t>
             </a:fld>
             <a:endParaRPr lang="fr-FR"/>
           </a:p>
@@ -1244,7 +1245,7 @@
           <a:p>
             <a:fld id="{20E875BE-3CC4-4E12-96A9-BB5604419CCF}" type="datetimeFigureOut">
               <a:rPr lang="fr-FR" smtClean="0"/>
-              <a:t>13/06/2023</a:t>
+              <a:t>19/06/2023</a:t>
             </a:fld>
             <a:endParaRPr lang="fr-FR"/>
           </a:p>
@@ -1611,7 +1612,7 @@
           <a:p>
             <a:fld id="{20E875BE-3CC4-4E12-96A9-BB5604419CCF}" type="datetimeFigureOut">
               <a:rPr lang="fr-FR" smtClean="0"/>
-              <a:t>13/06/2023</a:t>
+              <a:t>19/06/2023</a:t>
             </a:fld>
             <a:endParaRPr lang="fr-FR"/>
           </a:p>
@@ -1729,7 +1730,7 @@
           <a:p>
             <a:fld id="{20E875BE-3CC4-4E12-96A9-BB5604419CCF}" type="datetimeFigureOut">
               <a:rPr lang="fr-FR" smtClean="0"/>
-              <a:t>13/06/2023</a:t>
+              <a:t>19/06/2023</a:t>
             </a:fld>
             <a:endParaRPr lang="fr-FR"/>
           </a:p>
@@ -1824,7 +1825,7 @@
           <a:p>
             <a:fld id="{20E875BE-3CC4-4E12-96A9-BB5604419CCF}" type="datetimeFigureOut">
               <a:rPr lang="fr-FR" smtClean="0"/>
-              <a:t>13/06/2023</a:t>
+              <a:t>19/06/2023</a:t>
             </a:fld>
             <a:endParaRPr lang="fr-FR"/>
           </a:p>
@@ -2101,7 +2102,7 @@
           <a:p>
             <a:fld id="{20E875BE-3CC4-4E12-96A9-BB5604419CCF}" type="datetimeFigureOut">
               <a:rPr lang="fr-FR" smtClean="0"/>
-              <a:t>13/06/2023</a:t>
+              <a:t>19/06/2023</a:t>
             </a:fld>
             <a:endParaRPr lang="fr-FR"/>
           </a:p>
@@ -2358,7 +2359,7 @@
           <a:p>
             <a:fld id="{20E875BE-3CC4-4E12-96A9-BB5604419CCF}" type="datetimeFigureOut">
               <a:rPr lang="fr-FR" smtClean="0"/>
-              <a:t>13/06/2023</a:t>
+              <a:t>19/06/2023</a:t>
             </a:fld>
             <a:endParaRPr lang="fr-FR"/>
           </a:p>
@@ -2571,7 +2572,7 @@
           <a:p>
             <a:fld id="{20E875BE-3CC4-4E12-96A9-BB5604419CCF}" type="datetimeFigureOut">
               <a:rPr lang="fr-FR" smtClean="0"/>
-              <a:t>13/06/2023</a:t>
+              <a:t>19/06/2023</a:t>
             </a:fld>
             <a:endParaRPr lang="fr-FR"/>
           </a:p>
@@ -4349,7 +4350,6 @@
               <a:rPr lang="fr-FR" dirty="0"/>
               <a:t>Vert_Intensite</a:t>
             </a:r>
-            <a:endParaRPr lang="fr-FR" dirty="0"/>
           </a:p>
         </p:txBody>
       </p:sp>
@@ -4379,7 +4379,6 @@
               <a:rPr lang="fr-FR" dirty="0"/>
               <a:t>Bleu_Intensite</a:t>
             </a:r>
-            <a:endParaRPr lang="fr-FR" dirty="0"/>
           </a:p>
         </p:txBody>
       </p:sp>
@@ -6146,6 +6145,2136 @@
       </p:grpSpPr>
       <p:pic>
         <p:nvPicPr>
+          <p:cNvPr id="83" name="Image 82"/>
+          <p:cNvPicPr>
+            <a:picLocks noChangeAspect="1"/>
+          </p:cNvPicPr>
+          <p:nvPr/>
+        </p:nvPicPr>
+        <p:blipFill>
+          <a:blip r:embed="rId2"/>
+          <a:stretch>
+            <a:fillRect/>
+          </a:stretch>
+        </p:blipFill>
+        <p:spPr>
+          <a:xfrm>
+            <a:off x="12355833" y="2800190"/>
+            <a:ext cx="3182520" cy="2392091"/>
+          </a:xfrm>
+          <a:prstGeom prst="rect">
+            <a:avLst/>
+          </a:prstGeom>
+        </p:spPr>
+      </p:pic>
+      <p:sp>
+        <p:nvSpPr>
+          <p:cNvPr id="4" name="Rectangle 3"/>
+          <p:cNvSpPr/>
+          <p:nvPr/>
+        </p:nvSpPr>
+        <p:spPr>
+          <a:xfrm>
+            <a:off x="3578671" y="1068196"/>
+            <a:ext cx="1502228" cy="679966"/>
+          </a:xfrm>
+          <a:prstGeom prst="rect">
+            <a:avLst/>
+          </a:prstGeom>
+        </p:spPr>
+        <p:style>
+          <a:lnRef idx="2">
+            <a:schemeClr val="accent1">
+              <a:shade val="50000"/>
+            </a:schemeClr>
+          </a:lnRef>
+          <a:fillRef idx="1">
+            <a:schemeClr val="accent1"/>
+          </a:fillRef>
+          <a:effectRef idx="0">
+            <a:schemeClr val="accent1"/>
+          </a:effectRef>
+          <a:fontRef idx="minor">
+            <a:schemeClr val="lt1"/>
+          </a:fontRef>
+        </p:style>
+        <p:txBody>
+          <a:bodyPr rtlCol="0" anchor="ctr"/>
+          <a:lstStyle/>
+          <a:p>
+            <a:pPr algn="ctr"/>
+            <a:r>
+              <a:rPr lang="fr-FR" sz="2500" dirty="0"/>
+              <a:t>PLL</a:t>
+            </a:r>
+          </a:p>
+        </p:txBody>
+      </p:sp>
+      <p:cxnSp>
+        <p:nvCxnSpPr>
+          <p:cNvPr id="6" name="Connecteur droit avec flèche 5"/>
+          <p:cNvCxnSpPr>
+            <a:stCxn id="7" idx="3"/>
+          </p:cNvCxnSpPr>
+          <p:nvPr/>
+        </p:nvCxnSpPr>
+        <p:spPr>
+          <a:xfrm>
+            <a:off x="1126670" y="1223515"/>
+            <a:ext cx="576941" cy="1"/>
+          </a:xfrm>
+          <a:prstGeom prst="straightConnector1">
+            <a:avLst/>
+          </a:prstGeom>
+          <a:ln w="38100">
+            <a:solidFill>
+              <a:srgbClr val="7030A0"/>
+            </a:solidFill>
+            <a:tailEnd type="triangle"/>
+          </a:ln>
+        </p:spPr>
+        <p:style>
+          <a:lnRef idx="1">
+            <a:schemeClr val="accent1"/>
+          </a:lnRef>
+          <a:fillRef idx="0">
+            <a:schemeClr val="accent1"/>
+          </a:fillRef>
+          <a:effectRef idx="0">
+            <a:schemeClr val="accent1"/>
+          </a:effectRef>
+          <a:fontRef idx="minor">
+            <a:schemeClr val="tx1"/>
+          </a:fontRef>
+        </p:style>
+      </p:cxnSp>
+      <p:sp>
+        <p:nvSpPr>
+          <p:cNvPr id="7" name="ZoneTexte 6"/>
+          <p:cNvSpPr txBox="1"/>
+          <p:nvPr/>
+        </p:nvSpPr>
+        <p:spPr>
+          <a:xfrm>
+            <a:off x="337454" y="1038847"/>
+            <a:ext cx="789214" cy="369332"/>
+          </a:xfrm>
+          <a:prstGeom prst="rect">
+            <a:avLst/>
+          </a:prstGeom>
+          <a:noFill/>
+        </p:spPr>
+        <p:txBody>
+          <a:bodyPr wrap="square" rtlCol="0">
+            <a:spAutoFit/>
+          </a:bodyPr>
+          <a:lstStyle/>
+          <a:p>
+            <a:pPr algn="r"/>
+            <a:r>
+              <a:rPr lang="fr-FR" dirty="0"/>
+              <a:t>Clk</a:t>
+            </a:r>
+          </a:p>
+        </p:txBody>
+      </p:sp>
+      <p:cxnSp>
+        <p:nvCxnSpPr>
+          <p:cNvPr id="8" name="Connecteur droit avec flèche 7"/>
+          <p:cNvCxnSpPr>
+            <a:stCxn id="9" idx="3"/>
+          </p:cNvCxnSpPr>
+          <p:nvPr/>
+        </p:nvCxnSpPr>
+        <p:spPr>
+          <a:xfrm>
+            <a:off x="1126667" y="2615524"/>
+            <a:ext cx="576942" cy="4"/>
+          </a:xfrm>
+          <a:prstGeom prst="straightConnector1">
+            <a:avLst/>
+          </a:prstGeom>
+          <a:ln w="38100">
+            <a:solidFill>
+              <a:srgbClr val="7030A0"/>
+            </a:solidFill>
+            <a:tailEnd type="triangle"/>
+          </a:ln>
+        </p:spPr>
+        <p:style>
+          <a:lnRef idx="1">
+            <a:schemeClr val="accent1"/>
+          </a:lnRef>
+          <a:fillRef idx="0">
+            <a:schemeClr val="accent1"/>
+          </a:fillRef>
+          <a:effectRef idx="0">
+            <a:schemeClr val="accent1"/>
+          </a:effectRef>
+          <a:fontRef idx="minor">
+            <a:schemeClr val="tx1"/>
+          </a:fontRef>
+        </p:style>
+      </p:cxnSp>
+      <p:sp>
+        <p:nvSpPr>
+          <p:cNvPr id="9" name="ZoneTexte 8"/>
+          <p:cNvSpPr txBox="1"/>
+          <p:nvPr/>
+        </p:nvSpPr>
+        <p:spPr>
+          <a:xfrm>
+            <a:off x="134911" y="2430858"/>
+            <a:ext cx="991756" cy="369332"/>
+          </a:xfrm>
+          <a:prstGeom prst="rect">
+            <a:avLst/>
+          </a:prstGeom>
+          <a:noFill/>
+        </p:spPr>
+        <p:txBody>
+          <a:bodyPr wrap="square" rtlCol="0">
+            <a:spAutoFit/>
+          </a:bodyPr>
+          <a:lstStyle/>
+          <a:p>
+            <a:pPr algn="r"/>
+            <a:r>
+              <a:rPr lang="fr-FR" dirty="0" smtClean="0"/>
+              <a:t>Resetn</a:t>
+            </a:r>
+            <a:endParaRPr lang="fr-FR" dirty="0"/>
+          </a:p>
+        </p:txBody>
+      </p:sp>
+      <p:cxnSp>
+        <p:nvCxnSpPr>
+          <p:cNvPr id="10" name="Connecteur droit avec flèche 9"/>
+          <p:cNvCxnSpPr>
+            <a:stCxn id="4" idx="3"/>
+            <a:endCxn id="14" idx="1"/>
+          </p:cNvCxnSpPr>
+          <p:nvPr/>
+        </p:nvCxnSpPr>
+        <p:spPr>
+          <a:xfrm flipV="1">
+            <a:off x="5080901" y="1402346"/>
+            <a:ext cx="617767" cy="5835"/>
+          </a:xfrm>
+          <a:prstGeom prst="straightConnector1">
+            <a:avLst/>
+          </a:prstGeom>
+          <a:ln w="38100">
+            <a:solidFill>
+              <a:schemeClr val="tx1"/>
+            </a:solidFill>
+            <a:tailEnd type="triangle"/>
+          </a:ln>
+        </p:spPr>
+        <p:style>
+          <a:lnRef idx="1">
+            <a:schemeClr val="accent1"/>
+          </a:lnRef>
+          <a:fillRef idx="0">
+            <a:schemeClr val="accent1"/>
+          </a:fillRef>
+          <a:effectRef idx="0">
+            <a:schemeClr val="accent1"/>
+          </a:effectRef>
+          <a:fontRef idx="minor">
+            <a:schemeClr val="tx1"/>
+          </a:fontRef>
+        </p:style>
+      </p:cxnSp>
+      <p:sp>
+        <p:nvSpPr>
+          <p:cNvPr id="14" name="ZoneTexte 13"/>
+          <p:cNvSpPr txBox="1"/>
+          <p:nvPr/>
+        </p:nvSpPr>
+        <p:spPr>
+          <a:xfrm>
+            <a:off x="5698668" y="1217678"/>
+            <a:ext cx="1035051" cy="369332"/>
+          </a:xfrm>
+          <a:prstGeom prst="rect">
+            <a:avLst/>
+          </a:prstGeom>
+          <a:noFill/>
+        </p:spPr>
+        <p:txBody>
+          <a:bodyPr wrap="square" rtlCol="0">
+            <a:spAutoFit/>
+          </a:bodyPr>
+          <a:lstStyle/>
+          <a:p>
+            <a:r>
+              <a:rPr lang="fr-FR" dirty="0"/>
+              <a:t>Clk_Vga</a:t>
+            </a:r>
+          </a:p>
+        </p:txBody>
+      </p:sp>
+      <p:sp>
+        <p:nvSpPr>
+          <p:cNvPr id="11" name="Rectangle 10"/>
+          <p:cNvSpPr/>
+          <p:nvPr/>
+        </p:nvSpPr>
+        <p:spPr>
+          <a:xfrm>
+            <a:off x="3456209" y="4121389"/>
+            <a:ext cx="1377042" cy="668285"/>
+          </a:xfrm>
+          <a:prstGeom prst="rect">
+            <a:avLst/>
+          </a:prstGeom>
+        </p:spPr>
+        <p:style>
+          <a:lnRef idx="2">
+            <a:schemeClr val="accent1">
+              <a:shade val="50000"/>
+            </a:schemeClr>
+          </a:lnRef>
+          <a:fillRef idx="1">
+            <a:schemeClr val="accent1"/>
+          </a:fillRef>
+          <a:effectRef idx="0">
+            <a:schemeClr val="accent1"/>
+          </a:effectRef>
+          <a:fontRef idx="minor">
+            <a:schemeClr val="lt1"/>
+          </a:fontRef>
+        </p:style>
+        <p:txBody>
+          <a:bodyPr rtlCol="0" anchor="ctr"/>
+          <a:lstStyle/>
+          <a:p>
+            <a:pPr algn="ctr"/>
+            <a:r>
+              <a:rPr lang="fr-FR" sz="2500" dirty="0"/>
+              <a:t>Synchro</a:t>
+            </a:r>
+          </a:p>
+        </p:txBody>
+      </p:sp>
+      <p:cxnSp>
+        <p:nvCxnSpPr>
+          <p:cNvPr id="19" name="Connecteur droit avec flèche 18"/>
+          <p:cNvCxnSpPr>
+            <a:stCxn id="55" idx="3"/>
+            <a:endCxn id="67" idx="1"/>
+          </p:cNvCxnSpPr>
+          <p:nvPr/>
+        </p:nvCxnSpPr>
+        <p:spPr>
+          <a:xfrm>
+            <a:off x="8296251" y="4483581"/>
+            <a:ext cx="1132901" cy="5661"/>
+          </a:xfrm>
+          <a:prstGeom prst="straightConnector1">
+            <a:avLst/>
+          </a:prstGeom>
+          <a:ln w="38100">
+            <a:solidFill>
+              <a:srgbClr val="00B050"/>
+            </a:solidFill>
+            <a:tailEnd type="triangle"/>
+          </a:ln>
+        </p:spPr>
+        <p:style>
+          <a:lnRef idx="1">
+            <a:schemeClr val="accent1"/>
+          </a:lnRef>
+          <a:fillRef idx="0">
+            <a:schemeClr val="accent1"/>
+          </a:fillRef>
+          <a:effectRef idx="0">
+            <a:schemeClr val="accent1"/>
+          </a:effectRef>
+          <a:fontRef idx="minor">
+            <a:schemeClr val="tx1"/>
+          </a:fontRef>
+        </p:style>
+      </p:cxnSp>
+      <p:sp>
+        <p:nvSpPr>
+          <p:cNvPr id="22" name="ZoneTexte 21"/>
+          <p:cNvSpPr txBox="1"/>
+          <p:nvPr/>
+        </p:nvSpPr>
+        <p:spPr>
+          <a:xfrm>
+            <a:off x="8261301" y="3977333"/>
+            <a:ext cx="1197380" cy="276999"/>
+          </a:xfrm>
+          <a:prstGeom prst="rect">
+            <a:avLst/>
+          </a:prstGeom>
+          <a:noFill/>
+        </p:spPr>
+        <p:txBody>
+          <a:bodyPr wrap="square" rtlCol="0">
+            <a:spAutoFit/>
+          </a:bodyPr>
+          <a:lstStyle/>
+          <a:p>
+            <a:pPr algn="ctr"/>
+            <a:r>
+              <a:rPr lang="fr-FR" sz="1200" dirty="0"/>
+              <a:t>Rouge_Intensite</a:t>
+            </a:r>
+          </a:p>
+        </p:txBody>
+      </p:sp>
+      <p:sp>
+        <p:nvSpPr>
+          <p:cNvPr id="23" name="ZoneTexte 22"/>
+          <p:cNvSpPr txBox="1"/>
+          <p:nvPr/>
+        </p:nvSpPr>
+        <p:spPr>
+          <a:xfrm>
+            <a:off x="8296249" y="4248730"/>
+            <a:ext cx="1127485" cy="276999"/>
+          </a:xfrm>
+          <a:prstGeom prst="rect">
+            <a:avLst/>
+          </a:prstGeom>
+          <a:noFill/>
+        </p:spPr>
+        <p:txBody>
+          <a:bodyPr wrap="square" rtlCol="0">
+            <a:spAutoFit/>
+          </a:bodyPr>
+          <a:lstStyle/>
+          <a:p>
+            <a:pPr algn="ctr"/>
+            <a:r>
+              <a:rPr lang="fr-FR" sz="1200" dirty="0"/>
+              <a:t>Vert_Intensite</a:t>
+            </a:r>
+          </a:p>
+        </p:txBody>
+      </p:sp>
+      <p:sp>
+        <p:nvSpPr>
+          <p:cNvPr id="24" name="ZoneTexte 23"/>
+          <p:cNvSpPr txBox="1"/>
+          <p:nvPr/>
+        </p:nvSpPr>
+        <p:spPr>
+          <a:xfrm>
+            <a:off x="8296249" y="4475803"/>
+            <a:ext cx="1137337" cy="276999"/>
+          </a:xfrm>
+          <a:prstGeom prst="rect">
+            <a:avLst/>
+          </a:prstGeom>
+          <a:noFill/>
+        </p:spPr>
+        <p:txBody>
+          <a:bodyPr wrap="square" rtlCol="0">
+            <a:spAutoFit/>
+          </a:bodyPr>
+          <a:lstStyle/>
+          <a:p>
+            <a:pPr algn="ctr"/>
+            <a:r>
+              <a:rPr lang="fr-FR" sz="1200" dirty="0"/>
+              <a:t>Bleu_Intensite</a:t>
+            </a:r>
+          </a:p>
+        </p:txBody>
+      </p:sp>
+      <p:cxnSp>
+        <p:nvCxnSpPr>
+          <p:cNvPr id="28" name="Connecteur droit avec flèche 27"/>
+          <p:cNvCxnSpPr/>
+          <p:nvPr/>
+        </p:nvCxnSpPr>
+        <p:spPr>
+          <a:xfrm>
+            <a:off x="4827155" y="4345336"/>
+            <a:ext cx="1503494" cy="6729"/>
+          </a:xfrm>
+          <a:prstGeom prst="straightConnector1">
+            <a:avLst/>
+          </a:prstGeom>
+          <a:ln w="38100">
+            <a:solidFill>
+              <a:srgbClr val="7030A0"/>
+            </a:solidFill>
+            <a:tailEnd type="triangle"/>
+          </a:ln>
+        </p:spPr>
+        <p:style>
+          <a:lnRef idx="1">
+            <a:schemeClr val="accent1"/>
+          </a:lnRef>
+          <a:fillRef idx="0">
+            <a:schemeClr val="accent1"/>
+          </a:fillRef>
+          <a:effectRef idx="0">
+            <a:schemeClr val="accent1"/>
+          </a:effectRef>
+          <a:fontRef idx="minor">
+            <a:schemeClr val="tx1"/>
+          </a:fontRef>
+        </p:style>
+      </p:cxnSp>
+      <p:cxnSp>
+        <p:nvCxnSpPr>
+          <p:cNvPr id="29" name="Connecteur droit avec flèche 28"/>
+          <p:cNvCxnSpPr/>
+          <p:nvPr/>
+        </p:nvCxnSpPr>
+        <p:spPr>
+          <a:xfrm>
+            <a:off x="4827155" y="4652624"/>
+            <a:ext cx="1503495" cy="7482"/>
+          </a:xfrm>
+          <a:prstGeom prst="straightConnector1">
+            <a:avLst/>
+          </a:prstGeom>
+          <a:ln w="38100">
+            <a:solidFill>
+              <a:srgbClr val="7030A0"/>
+            </a:solidFill>
+            <a:tailEnd type="triangle"/>
+          </a:ln>
+        </p:spPr>
+        <p:style>
+          <a:lnRef idx="1">
+            <a:schemeClr val="accent1"/>
+          </a:lnRef>
+          <a:fillRef idx="0">
+            <a:schemeClr val="accent1"/>
+          </a:fillRef>
+          <a:effectRef idx="0">
+            <a:schemeClr val="accent1"/>
+          </a:effectRef>
+          <a:fontRef idx="minor">
+            <a:schemeClr val="tx1"/>
+          </a:fontRef>
+        </p:style>
+      </p:cxnSp>
+      <p:sp>
+        <p:nvSpPr>
+          <p:cNvPr id="30" name="ZoneTexte 29"/>
+          <p:cNvSpPr txBox="1"/>
+          <p:nvPr/>
+        </p:nvSpPr>
+        <p:spPr>
+          <a:xfrm>
+            <a:off x="9298519" y="2805712"/>
+            <a:ext cx="2623831" cy="369332"/>
+          </a:xfrm>
+          <a:prstGeom prst="rect">
+            <a:avLst/>
+          </a:prstGeom>
+          <a:noFill/>
+        </p:spPr>
+        <p:txBody>
+          <a:bodyPr wrap="square" rtlCol="0">
+            <a:spAutoFit/>
+          </a:bodyPr>
+          <a:lstStyle/>
+          <a:p>
+            <a:pPr algn="ctr"/>
+            <a:r>
+              <a:rPr lang="fr-FR" dirty="0"/>
+              <a:t>H_SYNCH</a:t>
+            </a:r>
+          </a:p>
+        </p:txBody>
+      </p:sp>
+      <p:sp>
+        <p:nvSpPr>
+          <p:cNvPr id="31" name="ZoneTexte 30"/>
+          <p:cNvSpPr txBox="1"/>
+          <p:nvPr/>
+        </p:nvSpPr>
+        <p:spPr>
+          <a:xfrm>
+            <a:off x="9298520" y="3187737"/>
+            <a:ext cx="2623830" cy="369332"/>
+          </a:xfrm>
+          <a:prstGeom prst="rect">
+            <a:avLst/>
+          </a:prstGeom>
+          <a:noFill/>
+        </p:spPr>
+        <p:txBody>
+          <a:bodyPr wrap="square" rtlCol="0">
+            <a:spAutoFit/>
+          </a:bodyPr>
+          <a:lstStyle/>
+          <a:p>
+            <a:pPr algn="ctr"/>
+            <a:r>
+              <a:rPr lang="fr-FR" dirty="0"/>
+              <a:t>V_SYNCH</a:t>
+            </a:r>
+          </a:p>
+        </p:txBody>
+      </p:sp>
+      <p:cxnSp>
+        <p:nvCxnSpPr>
+          <p:cNvPr id="33" name="Connecteur droit 32"/>
+          <p:cNvCxnSpPr/>
+          <p:nvPr/>
+        </p:nvCxnSpPr>
+        <p:spPr>
+          <a:xfrm flipH="1">
+            <a:off x="11068542" y="4103189"/>
+            <a:ext cx="108858" cy="155922"/>
+          </a:xfrm>
+          <a:prstGeom prst="line">
+            <a:avLst/>
+          </a:prstGeom>
+          <a:ln w="28575"/>
+        </p:spPr>
+        <p:style>
+          <a:lnRef idx="1">
+            <a:schemeClr val="accent1"/>
+          </a:lnRef>
+          <a:fillRef idx="0">
+            <a:schemeClr val="accent1"/>
+          </a:fillRef>
+          <a:effectRef idx="0">
+            <a:schemeClr val="accent1"/>
+          </a:effectRef>
+          <a:fontRef idx="minor">
+            <a:schemeClr val="tx1"/>
+          </a:fontRef>
+        </p:style>
+      </p:cxnSp>
+      <p:cxnSp>
+        <p:nvCxnSpPr>
+          <p:cNvPr id="34" name="Connecteur droit 33"/>
+          <p:cNvCxnSpPr/>
+          <p:nvPr/>
+        </p:nvCxnSpPr>
+        <p:spPr>
+          <a:xfrm flipH="1">
+            <a:off x="11065642" y="4434892"/>
+            <a:ext cx="108858" cy="155922"/>
+          </a:xfrm>
+          <a:prstGeom prst="line">
+            <a:avLst/>
+          </a:prstGeom>
+          <a:ln w="28575"/>
+        </p:spPr>
+        <p:style>
+          <a:lnRef idx="1">
+            <a:schemeClr val="accent1"/>
+          </a:lnRef>
+          <a:fillRef idx="0">
+            <a:schemeClr val="accent1"/>
+          </a:fillRef>
+          <a:effectRef idx="0">
+            <a:schemeClr val="accent1"/>
+          </a:effectRef>
+          <a:fontRef idx="minor">
+            <a:schemeClr val="tx1"/>
+          </a:fontRef>
+        </p:style>
+      </p:cxnSp>
+      <p:cxnSp>
+        <p:nvCxnSpPr>
+          <p:cNvPr id="35" name="Connecteur droit 34"/>
+          <p:cNvCxnSpPr/>
+          <p:nvPr/>
+        </p:nvCxnSpPr>
+        <p:spPr>
+          <a:xfrm flipH="1">
+            <a:off x="11065642" y="4763713"/>
+            <a:ext cx="108858" cy="155922"/>
+          </a:xfrm>
+          <a:prstGeom prst="line">
+            <a:avLst/>
+          </a:prstGeom>
+          <a:ln w="28575"/>
+        </p:spPr>
+        <p:style>
+          <a:lnRef idx="1">
+            <a:schemeClr val="accent1"/>
+          </a:lnRef>
+          <a:fillRef idx="0">
+            <a:schemeClr val="accent1"/>
+          </a:fillRef>
+          <a:effectRef idx="0">
+            <a:schemeClr val="accent1"/>
+          </a:effectRef>
+          <a:fontRef idx="minor">
+            <a:schemeClr val="tx1"/>
+          </a:fontRef>
+        </p:style>
+      </p:cxnSp>
+      <p:sp>
+        <p:nvSpPr>
+          <p:cNvPr id="36" name="ZoneTexte 35"/>
+          <p:cNvSpPr txBox="1"/>
+          <p:nvPr/>
+        </p:nvSpPr>
+        <p:spPr>
+          <a:xfrm>
+            <a:off x="10930913" y="4273305"/>
+            <a:ext cx="304800" cy="276999"/>
+          </a:xfrm>
+          <a:prstGeom prst="rect">
+            <a:avLst/>
+          </a:prstGeom>
+          <a:noFill/>
+        </p:spPr>
+        <p:txBody>
+          <a:bodyPr wrap="square" rtlCol="0">
+            <a:spAutoFit/>
+          </a:bodyPr>
+          <a:lstStyle/>
+          <a:p>
+            <a:r>
+              <a:rPr lang="fr-FR" sz="1200" dirty="0"/>
+              <a:t>4</a:t>
+            </a:r>
+          </a:p>
+        </p:txBody>
+      </p:sp>
+      <p:sp>
+        <p:nvSpPr>
+          <p:cNvPr id="37" name="ZoneTexte 36"/>
+          <p:cNvSpPr txBox="1"/>
+          <p:nvPr/>
+        </p:nvSpPr>
+        <p:spPr>
+          <a:xfrm>
+            <a:off x="10931197" y="3946774"/>
+            <a:ext cx="304800" cy="276999"/>
+          </a:xfrm>
+          <a:prstGeom prst="rect">
+            <a:avLst/>
+          </a:prstGeom>
+          <a:noFill/>
+        </p:spPr>
+        <p:txBody>
+          <a:bodyPr wrap="square" rtlCol="0">
+            <a:spAutoFit/>
+          </a:bodyPr>
+          <a:lstStyle/>
+          <a:p>
+            <a:r>
+              <a:rPr lang="fr-FR" sz="1200" dirty="0"/>
+              <a:t>4</a:t>
+            </a:r>
+          </a:p>
+        </p:txBody>
+      </p:sp>
+      <p:sp>
+        <p:nvSpPr>
+          <p:cNvPr id="38" name="ZoneTexte 37"/>
+          <p:cNvSpPr txBox="1"/>
+          <p:nvPr/>
+        </p:nvSpPr>
+        <p:spPr>
+          <a:xfrm>
+            <a:off x="10930913" y="4593877"/>
+            <a:ext cx="304800" cy="276999"/>
+          </a:xfrm>
+          <a:prstGeom prst="rect">
+            <a:avLst/>
+          </a:prstGeom>
+          <a:noFill/>
+        </p:spPr>
+        <p:txBody>
+          <a:bodyPr wrap="square" rtlCol="0">
+            <a:spAutoFit/>
+          </a:bodyPr>
+          <a:lstStyle/>
+          <a:p>
+            <a:r>
+              <a:rPr lang="fr-FR" sz="1200" dirty="0"/>
+              <a:t>4</a:t>
+            </a:r>
+          </a:p>
+        </p:txBody>
+      </p:sp>
+      <p:sp>
+        <p:nvSpPr>
+          <p:cNvPr id="39" name="Rectangle 38"/>
+          <p:cNvSpPr/>
+          <p:nvPr/>
+        </p:nvSpPr>
+        <p:spPr>
+          <a:xfrm>
+            <a:off x="1703608" y="439744"/>
+            <a:ext cx="9921149" cy="5901095"/>
+          </a:xfrm>
+          <a:prstGeom prst="rect">
+            <a:avLst/>
+          </a:prstGeom>
+          <a:noFill/>
+          <a:ln>
+            <a:solidFill>
+              <a:schemeClr val="accent1"/>
+            </a:solidFill>
+            <a:prstDash val="lgDash"/>
+          </a:ln>
+        </p:spPr>
+        <p:style>
+          <a:lnRef idx="2">
+            <a:schemeClr val="accent1">
+              <a:shade val="50000"/>
+            </a:schemeClr>
+          </a:lnRef>
+          <a:fillRef idx="1">
+            <a:schemeClr val="accent1"/>
+          </a:fillRef>
+          <a:effectRef idx="0">
+            <a:schemeClr val="accent1"/>
+          </a:effectRef>
+          <a:fontRef idx="minor">
+            <a:schemeClr val="lt1"/>
+          </a:fontRef>
+        </p:style>
+        <p:txBody>
+          <a:bodyPr rot="0" spcFirstLastPara="0" vertOverflow="overflow" horzOverflow="overflow" vert="horz" wrap="square" lIns="91440" tIns="45720" rIns="91440" bIns="45720" numCol="1" spcCol="0" rtlCol="0" fromWordArt="0" anchor="t" anchorCtr="0" forceAA="0" compatLnSpc="1">
+            <a:prstTxWarp prst="textNoShape">
+              <a:avLst/>
+            </a:prstTxWarp>
+            <a:noAutofit/>
+          </a:bodyPr>
+          <a:lstStyle/>
+          <a:p>
+            <a:pPr algn="r"/>
+            <a:r>
+              <a:rPr lang="fr-FR" dirty="0">
+                <a:solidFill>
+                  <a:srgbClr val="FF0000"/>
+                </a:solidFill>
+              </a:rPr>
+              <a:t>Solution </a:t>
+            </a:r>
+            <a:r>
+              <a:rPr lang="fr-FR" dirty="0" smtClean="0">
+                <a:solidFill>
+                  <a:srgbClr val="FF0000"/>
+                </a:solidFill>
+              </a:rPr>
+              <a:t>Finale</a:t>
+            </a:r>
+            <a:endParaRPr lang="fr-FR" dirty="0" smtClean="0">
+              <a:solidFill>
+                <a:srgbClr val="FF0000"/>
+              </a:solidFill>
+            </a:endParaRPr>
+          </a:p>
+          <a:p>
+            <a:pPr algn="r"/>
+            <a:r>
+              <a:rPr lang="fr-FR" dirty="0">
+                <a:solidFill>
+                  <a:srgbClr val="FF0000"/>
+                </a:solidFill>
+              </a:rPr>
+              <a:t>#Generateur_Pattern</a:t>
+            </a:r>
+          </a:p>
+        </p:txBody>
+      </p:sp>
+      <p:cxnSp>
+        <p:nvCxnSpPr>
+          <p:cNvPr id="45" name="Connecteur en angle 44"/>
+          <p:cNvCxnSpPr/>
+          <p:nvPr/>
+        </p:nvCxnSpPr>
+        <p:spPr>
+          <a:xfrm flipV="1">
+            <a:off x="1703609" y="1223516"/>
+            <a:ext cx="1875062" cy="1"/>
+          </a:xfrm>
+          <a:prstGeom prst="bentConnector3">
+            <a:avLst/>
+          </a:prstGeom>
+          <a:ln w="38100">
+            <a:solidFill>
+              <a:srgbClr val="7030A0"/>
+            </a:solidFill>
+            <a:tailEnd type="triangle"/>
+          </a:ln>
+        </p:spPr>
+        <p:style>
+          <a:lnRef idx="1">
+            <a:schemeClr val="accent1"/>
+          </a:lnRef>
+          <a:fillRef idx="0">
+            <a:schemeClr val="accent1"/>
+          </a:fillRef>
+          <a:effectRef idx="0">
+            <a:schemeClr val="accent1"/>
+          </a:effectRef>
+          <a:fontRef idx="minor">
+            <a:schemeClr val="tx1"/>
+          </a:fontRef>
+        </p:style>
+      </p:cxnSp>
+      <p:cxnSp>
+        <p:nvCxnSpPr>
+          <p:cNvPr id="52" name="Connecteur en angle 51"/>
+          <p:cNvCxnSpPr>
+            <a:endCxn id="11" idx="0"/>
+          </p:cNvCxnSpPr>
+          <p:nvPr/>
+        </p:nvCxnSpPr>
+        <p:spPr>
+          <a:xfrm rot="5400000">
+            <a:off x="3383485" y="2163594"/>
+            <a:ext cx="2719041" cy="1196549"/>
+          </a:xfrm>
+          <a:prstGeom prst="bentConnector3">
+            <a:avLst>
+              <a:gd name="adj1" fmla="val 82958"/>
+            </a:avLst>
+          </a:prstGeom>
+          <a:ln w="38100">
+            <a:solidFill>
+              <a:schemeClr val="tx1"/>
+            </a:solidFill>
+            <a:tailEnd type="triangle"/>
+          </a:ln>
+        </p:spPr>
+        <p:style>
+          <a:lnRef idx="1">
+            <a:schemeClr val="accent1"/>
+          </a:lnRef>
+          <a:fillRef idx="0">
+            <a:schemeClr val="accent1"/>
+          </a:fillRef>
+          <a:effectRef idx="0">
+            <a:schemeClr val="accent1"/>
+          </a:effectRef>
+          <a:fontRef idx="minor">
+            <a:schemeClr val="tx1"/>
+          </a:fontRef>
+        </p:style>
+      </p:cxnSp>
+      <p:cxnSp>
+        <p:nvCxnSpPr>
+          <p:cNvPr id="54" name="Connecteur en angle 53"/>
+          <p:cNvCxnSpPr/>
+          <p:nvPr/>
+        </p:nvCxnSpPr>
+        <p:spPr>
+          <a:xfrm flipV="1">
+            <a:off x="1703609" y="1587010"/>
+            <a:ext cx="1875062" cy="1028513"/>
+          </a:xfrm>
+          <a:prstGeom prst="bentConnector3">
+            <a:avLst>
+              <a:gd name="adj1" fmla="val 46613"/>
+            </a:avLst>
+          </a:prstGeom>
+          <a:ln w="38100">
+            <a:solidFill>
+              <a:srgbClr val="7030A0"/>
+            </a:solidFill>
+            <a:tailEnd type="triangle"/>
+          </a:ln>
+        </p:spPr>
+        <p:style>
+          <a:lnRef idx="1">
+            <a:schemeClr val="accent1"/>
+          </a:lnRef>
+          <a:fillRef idx="0">
+            <a:schemeClr val="accent1"/>
+          </a:fillRef>
+          <a:effectRef idx="0">
+            <a:schemeClr val="accent1"/>
+          </a:effectRef>
+          <a:fontRef idx="minor">
+            <a:schemeClr val="tx1"/>
+          </a:fontRef>
+        </p:style>
+      </p:cxnSp>
+      <p:cxnSp>
+        <p:nvCxnSpPr>
+          <p:cNvPr id="56" name="Connecteur en angle 55"/>
+          <p:cNvCxnSpPr>
+            <a:stCxn id="4" idx="2"/>
+            <a:endCxn id="11" idx="1"/>
+          </p:cNvCxnSpPr>
+          <p:nvPr/>
+        </p:nvCxnSpPr>
+        <p:spPr>
+          <a:xfrm rot="5400000">
+            <a:off x="2539312" y="2665059"/>
+            <a:ext cx="2707370" cy="873576"/>
+          </a:xfrm>
+          <a:prstGeom prst="bentConnector4">
+            <a:avLst>
+              <a:gd name="adj1" fmla="val 43829"/>
+              <a:gd name="adj2" fmla="val 248001"/>
+            </a:avLst>
+          </a:prstGeom>
+          <a:ln w="38100">
+            <a:solidFill>
+              <a:schemeClr val="accent4"/>
+            </a:solidFill>
+            <a:tailEnd type="triangle"/>
+          </a:ln>
+        </p:spPr>
+        <p:style>
+          <a:lnRef idx="1">
+            <a:schemeClr val="accent1"/>
+          </a:lnRef>
+          <a:fillRef idx="0">
+            <a:schemeClr val="accent1"/>
+          </a:fillRef>
+          <a:effectRef idx="0">
+            <a:schemeClr val="accent1"/>
+          </a:effectRef>
+          <a:fontRef idx="minor">
+            <a:schemeClr val="tx1"/>
+          </a:fontRef>
+        </p:style>
+      </p:cxnSp>
+      <p:pic>
+        <p:nvPicPr>
+          <p:cNvPr id="84" name="Image 83"/>
+          <p:cNvPicPr>
+            <a:picLocks noChangeAspect="1"/>
+          </p:cNvPicPr>
+          <p:nvPr/>
+        </p:nvPicPr>
+        <p:blipFill>
+          <a:blip r:embed="rId3"/>
+          <a:stretch>
+            <a:fillRect/>
+          </a:stretch>
+        </p:blipFill>
+        <p:spPr>
+          <a:xfrm>
+            <a:off x="16406706" y="3123837"/>
+            <a:ext cx="2486025" cy="1562100"/>
+          </a:xfrm>
+          <a:prstGeom prst="rect">
+            <a:avLst/>
+          </a:prstGeom>
+        </p:spPr>
+      </p:pic>
+      <p:cxnSp>
+        <p:nvCxnSpPr>
+          <p:cNvPr id="85" name="Connecteur droit avec flèche 84"/>
+          <p:cNvCxnSpPr/>
+          <p:nvPr/>
+        </p:nvCxnSpPr>
+        <p:spPr>
+          <a:xfrm>
+            <a:off x="15442229" y="3896702"/>
+            <a:ext cx="919448" cy="1"/>
+          </a:xfrm>
+          <a:prstGeom prst="straightConnector1">
+            <a:avLst/>
+          </a:prstGeom>
+          <a:ln w="38100">
+            <a:tailEnd type="triangle"/>
+          </a:ln>
+        </p:spPr>
+        <p:style>
+          <a:lnRef idx="1">
+            <a:schemeClr val="accent1"/>
+          </a:lnRef>
+          <a:fillRef idx="0">
+            <a:schemeClr val="accent1"/>
+          </a:fillRef>
+          <a:effectRef idx="0">
+            <a:schemeClr val="accent1"/>
+          </a:effectRef>
+          <a:fontRef idx="minor">
+            <a:schemeClr val="tx1"/>
+          </a:fontRef>
+        </p:style>
+      </p:cxnSp>
+      <p:pic>
+        <p:nvPicPr>
+          <p:cNvPr id="88" name="Image 87"/>
+          <p:cNvPicPr>
+            <a:picLocks noChangeAspect="1"/>
+          </p:cNvPicPr>
+          <p:nvPr/>
+        </p:nvPicPr>
+        <p:blipFill>
+          <a:blip r:embed="rId4"/>
+          <a:stretch>
+            <a:fillRect/>
+          </a:stretch>
+        </p:blipFill>
+        <p:spPr>
+          <a:xfrm>
+            <a:off x="7045487" y="1244871"/>
+            <a:ext cx="2303333" cy="1316974"/>
+          </a:xfrm>
+          <a:prstGeom prst="rect">
+            <a:avLst/>
+          </a:prstGeom>
+        </p:spPr>
+      </p:pic>
+      <p:cxnSp>
+        <p:nvCxnSpPr>
+          <p:cNvPr id="90" name="Connecteur en arc 89"/>
+          <p:cNvCxnSpPr>
+            <a:endCxn id="88" idx="1"/>
+          </p:cNvCxnSpPr>
+          <p:nvPr/>
+        </p:nvCxnSpPr>
+        <p:spPr>
+          <a:xfrm rot="5400000" flipH="1" flipV="1">
+            <a:off x="5731992" y="2647172"/>
+            <a:ext cx="2057309" cy="569682"/>
+          </a:xfrm>
+          <a:prstGeom prst="curvedConnector2">
+            <a:avLst/>
+          </a:prstGeom>
+          <a:ln>
+            <a:solidFill>
+              <a:schemeClr val="tx1"/>
+            </a:solidFill>
+            <a:tailEnd type="triangle"/>
+          </a:ln>
+        </p:spPr>
+        <p:style>
+          <a:lnRef idx="1">
+            <a:schemeClr val="accent1"/>
+          </a:lnRef>
+          <a:fillRef idx="0">
+            <a:schemeClr val="accent1"/>
+          </a:fillRef>
+          <a:effectRef idx="0">
+            <a:schemeClr val="accent1"/>
+          </a:effectRef>
+          <a:fontRef idx="minor">
+            <a:schemeClr val="tx1"/>
+          </a:fontRef>
+        </p:style>
+      </p:cxnSp>
+      <p:cxnSp>
+        <p:nvCxnSpPr>
+          <p:cNvPr id="92" name="Connecteur en arc 91"/>
+          <p:cNvCxnSpPr>
+            <a:stCxn id="88" idx="3"/>
+          </p:cNvCxnSpPr>
+          <p:nvPr/>
+        </p:nvCxnSpPr>
+        <p:spPr>
+          <a:xfrm>
+            <a:off x="9348820" y="1903358"/>
+            <a:ext cx="731076" cy="2057309"/>
+          </a:xfrm>
+          <a:prstGeom prst="curvedConnector2">
+            <a:avLst/>
+          </a:prstGeom>
+          <a:ln>
+            <a:solidFill>
+              <a:schemeClr val="tx1"/>
+            </a:solidFill>
+            <a:tailEnd type="triangle"/>
+          </a:ln>
+        </p:spPr>
+        <p:style>
+          <a:lnRef idx="1">
+            <a:schemeClr val="accent1"/>
+          </a:lnRef>
+          <a:fillRef idx="0">
+            <a:schemeClr val="accent1"/>
+          </a:fillRef>
+          <a:effectRef idx="0">
+            <a:schemeClr val="accent1"/>
+          </a:effectRef>
+          <a:fontRef idx="minor">
+            <a:schemeClr val="tx1"/>
+          </a:fontRef>
+        </p:style>
+      </p:cxnSp>
+      <p:sp>
+        <p:nvSpPr>
+          <p:cNvPr id="93" name="ZoneTexte 92"/>
+          <p:cNvSpPr txBox="1"/>
+          <p:nvPr/>
+        </p:nvSpPr>
+        <p:spPr>
+          <a:xfrm>
+            <a:off x="7036794" y="925806"/>
+            <a:ext cx="2449014" cy="369332"/>
+          </a:xfrm>
+          <a:prstGeom prst="rect">
+            <a:avLst/>
+          </a:prstGeom>
+          <a:noFill/>
+        </p:spPr>
+        <p:txBody>
+          <a:bodyPr wrap="square" rtlCol="0">
+            <a:spAutoFit/>
+          </a:bodyPr>
+          <a:lstStyle/>
+          <a:p>
+            <a:pPr algn="ctr"/>
+            <a:r>
+              <a:rPr lang="fr-FR" dirty="0" smtClean="0"/>
+              <a:t>Patern à réaliser</a:t>
+            </a:r>
+            <a:endParaRPr lang="fr-FR" dirty="0"/>
+          </a:p>
+        </p:txBody>
+      </p:sp>
+      <p:sp>
+        <p:nvSpPr>
+          <p:cNvPr id="43" name="ZoneTexte 42"/>
+          <p:cNvSpPr txBox="1"/>
+          <p:nvPr/>
+        </p:nvSpPr>
+        <p:spPr>
+          <a:xfrm>
+            <a:off x="2181139" y="4121389"/>
+            <a:ext cx="1275069" cy="369332"/>
+          </a:xfrm>
+          <a:prstGeom prst="rect">
+            <a:avLst/>
+          </a:prstGeom>
+          <a:noFill/>
+        </p:spPr>
+        <p:txBody>
+          <a:bodyPr wrap="square" rtlCol="0">
+            <a:spAutoFit/>
+          </a:bodyPr>
+          <a:lstStyle/>
+          <a:p>
+            <a:pPr algn="ctr"/>
+            <a:r>
+              <a:rPr lang="fr-FR" dirty="0" smtClean="0"/>
+              <a:t>Resetn</a:t>
+            </a:r>
+            <a:endParaRPr lang="fr-FR" dirty="0"/>
+          </a:p>
+        </p:txBody>
+      </p:sp>
+      <p:sp>
+        <p:nvSpPr>
+          <p:cNvPr id="44" name="ZoneTexte 43"/>
+          <p:cNvSpPr txBox="1"/>
+          <p:nvPr/>
+        </p:nvSpPr>
+        <p:spPr>
+          <a:xfrm>
+            <a:off x="3360385" y="1745244"/>
+            <a:ext cx="991756" cy="369332"/>
+          </a:xfrm>
+          <a:prstGeom prst="rect">
+            <a:avLst/>
+          </a:prstGeom>
+          <a:noFill/>
+        </p:spPr>
+        <p:txBody>
+          <a:bodyPr wrap="square" rtlCol="0">
+            <a:spAutoFit/>
+          </a:bodyPr>
+          <a:lstStyle/>
+          <a:p>
+            <a:pPr algn="r"/>
+            <a:r>
+              <a:rPr lang="fr-FR" dirty="0" smtClean="0"/>
+              <a:t>Locked</a:t>
+            </a:r>
+            <a:endParaRPr lang="fr-FR" dirty="0"/>
+          </a:p>
+        </p:txBody>
+      </p:sp>
+      <p:sp>
+        <p:nvSpPr>
+          <p:cNvPr id="55" name="Rectangle 54"/>
+          <p:cNvSpPr/>
+          <p:nvPr/>
+        </p:nvSpPr>
+        <p:spPr>
+          <a:xfrm>
+            <a:off x="6336743" y="3969555"/>
+            <a:ext cx="1959508" cy="1028052"/>
+          </a:xfrm>
+          <a:prstGeom prst="rect">
+            <a:avLst/>
+          </a:prstGeom>
+        </p:spPr>
+        <p:style>
+          <a:lnRef idx="2">
+            <a:schemeClr val="accent1">
+              <a:shade val="50000"/>
+            </a:schemeClr>
+          </a:lnRef>
+          <a:fillRef idx="1">
+            <a:schemeClr val="accent1"/>
+          </a:fillRef>
+          <a:effectRef idx="0">
+            <a:schemeClr val="accent1"/>
+          </a:effectRef>
+          <a:fontRef idx="minor">
+            <a:schemeClr val="lt1"/>
+          </a:fontRef>
+        </p:style>
+        <p:txBody>
+          <a:bodyPr rtlCol="0" anchor="ctr"/>
+          <a:lstStyle/>
+          <a:p>
+            <a:pPr algn="ctr"/>
+            <a:r>
+              <a:rPr lang="fr-FR" sz="2500" dirty="0" smtClean="0"/>
+              <a:t>Pattern_VGA</a:t>
+            </a:r>
+            <a:endParaRPr lang="fr-FR" sz="2500" dirty="0"/>
+          </a:p>
+        </p:txBody>
+      </p:sp>
+      <p:cxnSp>
+        <p:nvCxnSpPr>
+          <p:cNvPr id="58" name="Connecteur en angle 57"/>
+          <p:cNvCxnSpPr>
+            <a:stCxn id="11" idx="1"/>
+            <a:endCxn id="55" idx="2"/>
+          </p:cNvCxnSpPr>
+          <p:nvPr/>
+        </p:nvCxnSpPr>
+        <p:spPr>
+          <a:xfrm rot="10800000" flipH="1" flipV="1">
+            <a:off x="3456209" y="4455531"/>
+            <a:ext cx="3860288" cy="542075"/>
+          </a:xfrm>
+          <a:prstGeom prst="bentConnector4">
+            <a:avLst>
+              <a:gd name="adj1" fmla="val -5922"/>
+              <a:gd name="adj2" fmla="val 142171"/>
+            </a:avLst>
+          </a:prstGeom>
+          <a:ln w="38100">
+            <a:solidFill>
+              <a:schemeClr val="accent4"/>
+            </a:solidFill>
+            <a:tailEnd type="triangle"/>
+          </a:ln>
+        </p:spPr>
+        <p:style>
+          <a:lnRef idx="1">
+            <a:schemeClr val="accent1"/>
+          </a:lnRef>
+          <a:fillRef idx="0">
+            <a:schemeClr val="accent1"/>
+          </a:fillRef>
+          <a:effectRef idx="0">
+            <a:schemeClr val="accent1"/>
+          </a:effectRef>
+          <a:fontRef idx="minor">
+            <a:schemeClr val="tx1"/>
+          </a:fontRef>
+        </p:style>
+      </p:cxnSp>
+      <p:cxnSp>
+        <p:nvCxnSpPr>
+          <p:cNvPr id="66" name="Connecteur en angle 65"/>
+          <p:cNvCxnSpPr>
+            <a:stCxn id="11" idx="0"/>
+            <a:endCxn id="55" idx="0"/>
+          </p:cNvCxnSpPr>
+          <p:nvPr/>
+        </p:nvCxnSpPr>
+        <p:spPr>
+          <a:xfrm rot="5400000" flipH="1" flipV="1">
+            <a:off x="5654696" y="2459589"/>
+            <a:ext cx="151834" cy="3171767"/>
+          </a:xfrm>
+          <a:prstGeom prst="bentConnector3">
+            <a:avLst>
+              <a:gd name="adj1" fmla="val 309110"/>
+            </a:avLst>
+          </a:prstGeom>
+          <a:ln w="38100">
+            <a:solidFill>
+              <a:schemeClr val="tx1"/>
+            </a:solidFill>
+            <a:tailEnd type="triangle"/>
+          </a:ln>
+        </p:spPr>
+        <p:style>
+          <a:lnRef idx="1">
+            <a:schemeClr val="accent1"/>
+          </a:lnRef>
+          <a:fillRef idx="0">
+            <a:schemeClr val="accent1"/>
+          </a:fillRef>
+          <a:effectRef idx="0">
+            <a:schemeClr val="accent1"/>
+          </a:effectRef>
+          <a:fontRef idx="minor">
+            <a:schemeClr val="tx1"/>
+          </a:fontRef>
+        </p:style>
+      </p:cxnSp>
+      <p:cxnSp>
+        <p:nvCxnSpPr>
+          <p:cNvPr id="86" name="Connecteur droit avec flèche 85"/>
+          <p:cNvCxnSpPr/>
+          <p:nvPr/>
+        </p:nvCxnSpPr>
+        <p:spPr>
+          <a:xfrm>
+            <a:off x="8301666" y="4237830"/>
+            <a:ext cx="1122069" cy="1246"/>
+          </a:xfrm>
+          <a:prstGeom prst="straightConnector1">
+            <a:avLst/>
+          </a:prstGeom>
+          <a:ln w="38100">
+            <a:solidFill>
+              <a:srgbClr val="FF0000"/>
+            </a:solidFill>
+            <a:tailEnd type="triangle"/>
+          </a:ln>
+        </p:spPr>
+        <p:style>
+          <a:lnRef idx="1">
+            <a:schemeClr val="accent1"/>
+          </a:lnRef>
+          <a:fillRef idx="0">
+            <a:schemeClr val="accent1"/>
+          </a:fillRef>
+          <a:effectRef idx="0">
+            <a:schemeClr val="accent1"/>
+          </a:effectRef>
+          <a:fontRef idx="minor">
+            <a:schemeClr val="tx1"/>
+          </a:fontRef>
+        </p:style>
+      </p:cxnSp>
+      <p:cxnSp>
+        <p:nvCxnSpPr>
+          <p:cNvPr id="87" name="Connecteur droit avec flèche 86"/>
+          <p:cNvCxnSpPr/>
+          <p:nvPr/>
+        </p:nvCxnSpPr>
+        <p:spPr>
+          <a:xfrm>
+            <a:off x="8300686" y="4740639"/>
+            <a:ext cx="1128465" cy="1857"/>
+          </a:xfrm>
+          <a:prstGeom prst="straightConnector1">
+            <a:avLst/>
+          </a:prstGeom>
+          <a:ln w="38100">
+            <a:tailEnd type="triangle"/>
+          </a:ln>
+        </p:spPr>
+        <p:style>
+          <a:lnRef idx="1">
+            <a:schemeClr val="accent1"/>
+          </a:lnRef>
+          <a:fillRef idx="0">
+            <a:schemeClr val="accent1"/>
+          </a:fillRef>
+          <a:effectRef idx="0">
+            <a:schemeClr val="accent1"/>
+          </a:effectRef>
+          <a:fontRef idx="minor">
+            <a:schemeClr val="tx1"/>
+          </a:fontRef>
+        </p:style>
+      </p:cxnSp>
+      <p:cxnSp>
+        <p:nvCxnSpPr>
+          <p:cNvPr id="94" name="Connecteur en angle 93"/>
+          <p:cNvCxnSpPr/>
+          <p:nvPr/>
+        </p:nvCxnSpPr>
+        <p:spPr>
+          <a:xfrm flipV="1">
+            <a:off x="4461329" y="3135073"/>
+            <a:ext cx="8070011" cy="968358"/>
+          </a:xfrm>
+          <a:prstGeom prst="bentConnector3">
+            <a:avLst>
+              <a:gd name="adj1" fmla="val -45"/>
+            </a:avLst>
+          </a:prstGeom>
+          <a:ln w="38100">
+            <a:solidFill>
+              <a:srgbClr val="7030A0"/>
+            </a:solidFill>
+            <a:tailEnd type="triangle"/>
+          </a:ln>
+        </p:spPr>
+        <p:style>
+          <a:lnRef idx="1">
+            <a:schemeClr val="accent1"/>
+          </a:lnRef>
+          <a:fillRef idx="0">
+            <a:schemeClr val="accent1"/>
+          </a:fillRef>
+          <a:effectRef idx="0">
+            <a:schemeClr val="accent1"/>
+          </a:effectRef>
+          <a:fontRef idx="minor">
+            <a:schemeClr val="tx1"/>
+          </a:fontRef>
+        </p:style>
+      </p:cxnSp>
+      <p:cxnSp>
+        <p:nvCxnSpPr>
+          <p:cNvPr id="112" name="Connecteur en angle 111"/>
+          <p:cNvCxnSpPr/>
+          <p:nvPr/>
+        </p:nvCxnSpPr>
+        <p:spPr>
+          <a:xfrm flipV="1">
+            <a:off x="4677439" y="3519143"/>
+            <a:ext cx="7846462" cy="575401"/>
+          </a:xfrm>
+          <a:prstGeom prst="bentConnector3">
+            <a:avLst>
+              <a:gd name="adj1" fmla="val -14"/>
+            </a:avLst>
+          </a:prstGeom>
+          <a:ln w="38100">
+            <a:solidFill>
+              <a:srgbClr val="7030A0"/>
+            </a:solidFill>
+            <a:tailEnd type="triangle"/>
+          </a:ln>
+        </p:spPr>
+        <p:style>
+          <a:lnRef idx="1">
+            <a:schemeClr val="accent1"/>
+          </a:lnRef>
+          <a:fillRef idx="0">
+            <a:schemeClr val="accent1"/>
+          </a:fillRef>
+          <a:effectRef idx="0">
+            <a:schemeClr val="accent1"/>
+          </a:effectRef>
+          <a:fontRef idx="minor">
+            <a:schemeClr val="tx1"/>
+          </a:fontRef>
+        </p:style>
+      </p:cxnSp>
+      <p:sp>
+        <p:nvSpPr>
+          <p:cNvPr id="126" name="ZoneTexte 125"/>
+          <p:cNvSpPr txBox="1"/>
+          <p:nvPr/>
+        </p:nvSpPr>
+        <p:spPr>
+          <a:xfrm>
+            <a:off x="4839345" y="3969555"/>
+            <a:ext cx="1497398" cy="369332"/>
+          </a:xfrm>
+          <a:prstGeom prst="rect">
+            <a:avLst/>
+          </a:prstGeom>
+          <a:noFill/>
+        </p:spPr>
+        <p:txBody>
+          <a:bodyPr wrap="square" rtlCol="0">
+            <a:spAutoFit/>
+          </a:bodyPr>
+          <a:lstStyle/>
+          <a:p>
+            <a:pPr algn="ctr"/>
+            <a:r>
+              <a:rPr lang="fr-FR" dirty="0" smtClean="0"/>
+              <a:t>Position_H</a:t>
+            </a:r>
+            <a:endParaRPr lang="fr-FR" dirty="0"/>
+          </a:p>
+        </p:txBody>
+      </p:sp>
+      <p:sp>
+        <p:nvSpPr>
+          <p:cNvPr id="127" name="ZoneTexte 126"/>
+          <p:cNvSpPr txBox="1"/>
+          <p:nvPr/>
+        </p:nvSpPr>
+        <p:spPr>
+          <a:xfrm>
+            <a:off x="4827153" y="4312973"/>
+            <a:ext cx="1503496" cy="369332"/>
+          </a:xfrm>
+          <a:prstGeom prst="rect">
+            <a:avLst/>
+          </a:prstGeom>
+          <a:noFill/>
+        </p:spPr>
+        <p:txBody>
+          <a:bodyPr wrap="square" rtlCol="0">
+            <a:spAutoFit/>
+          </a:bodyPr>
+          <a:lstStyle/>
+          <a:p>
+            <a:pPr algn="ctr"/>
+            <a:r>
+              <a:rPr lang="fr-FR" dirty="0" smtClean="0"/>
+              <a:t>Position_V</a:t>
+            </a:r>
+            <a:endParaRPr lang="fr-FR" dirty="0"/>
+          </a:p>
+        </p:txBody>
+      </p:sp>
+      <p:sp>
+        <p:nvSpPr>
+          <p:cNvPr id="67" name="Rectangle 66"/>
+          <p:cNvSpPr/>
+          <p:nvPr/>
+        </p:nvSpPr>
+        <p:spPr>
+          <a:xfrm>
+            <a:off x="9429152" y="3975216"/>
+            <a:ext cx="1959508" cy="1028052"/>
+          </a:xfrm>
+          <a:prstGeom prst="rect">
+            <a:avLst/>
+          </a:prstGeom>
+        </p:spPr>
+        <p:style>
+          <a:lnRef idx="2">
+            <a:schemeClr val="accent1">
+              <a:shade val="50000"/>
+            </a:schemeClr>
+          </a:lnRef>
+          <a:fillRef idx="1">
+            <a:schemeClr val="accent1"/>
+          </a:fillRef>
+          <a:effectRef idx="0">
+            <a:schemeClr val="accent1"/>
+          </a:effectRef>
+          <a:fontRef idx="minor">
+            <a:schemeClr val="lt1"/>
+          </a:fontRef>
+        </p:style>
+        <p:txBody>
+          <a:bodyPr rtlCol="0" anchor="ctr"/>
+          <a:lstStyle/>
+          <a:p>
+            <a:pPr algn="ctr"/>
+            <a:r>
+              <a:rPr lang="fr-FR" sz="2500" dirty="0" smtClean="0"/>
+              <a:t>Filtre Gaussien</a:t>
+            </a:r>
+            <a:endParaRPr lang="fr-FR" sz="2500" dirty="0"/>
+          </a:p>
+        </p:txBody>
+      </p:sp>
+      <p:cxnSp>
+        <p:nvCxnSpPr>
+          <p:cNvPr id="73" name="Connecteur droit avec flèche 72"/>
+          <p:cNvCxnSpPr/>
+          <p:nvPr/>
+        </p:nvCxnSpPr>
+        <p:spPr>
+          <a:xfrm>
+            <a:off x="11383241" y="4483581"/>
+            <a:ext cx="1132901" cy="5661"/>
+          </a:xfrm>
+          <a:prstGeom prst="straightConnector1">
+            <a:avLst/>
+          </a:prstGeom>
+          <a:ln w="38100">
+            <a:solidFill>
+              <a:srgbClr val="00B050"/>
+            </a:solidFill>
+            <a:tailEnd type="triangle"/>
+          </a:ln>
+        </p:spPr>
+        <p:style>
+          <a:lnRef idx="1">
+            <a:schemeClr val="accent1"/>
+          </a:lnRef>
+          <a:fillRef idx="0">
+            <a:schemeClr val="accent1"/>
+          </a:fillRef>
+          <a:effectRef idx="0">
+            <a:schemeClr val="accent1"/>
+          </a:effectRef>
+          <a:fontRef idx="minor">
+            <a:schemeClr val="tx1"/>
+          </a:fontRef>
+        </p:style>
+      </p:cxnSp>
+      <p:sp>
+        <p:nvSpPr>
+          <p:cNvPr id="74" name="ZoneTexte 73"/>
+          <p:cNvSpPr txBox="1"/>
+          <p:nvPr/>
+        </p:nvSpPr>
+        <p:spPr>
+          <a:xfrm>
+            <a:off x="11348291" y="3977333"/>
+            <a:ext cx="1197380" cy="276999"/>
+          </a:xfrm>
+          <a:prstGeom prst="rect">
+            <a:avLst/>
+          </a:prstGeom>
+          <a:noFill/>
+        </p:spPr>
+        <p:txBody>
+          <a:bodyPr wrap="square" rtlCol="0">
+            <a:spAutoFit/>
+          </a:bodyPr>
+          <a:lstStyle/>
+          <a:p>
+            <a:pPr algn="ctr"/>
+            <a:r>
+              <a:rPr lang="fr-FR" sz="1200" dirty="0" smtClean="0"/>
+              <a:t>Rouge</a:t>
+            </a:r>
+            <a:endParaRPr lang="fr-FR" sz="1200" dirty="0"/>
+          </a:p>
+        </p:txBody>
+      </p:sp>
+      <p:sp>
+        <p:nvSpPr>
+          <p:cNvPr id="75" name="ZoneTexte 74"/>
+          <p:cNvSpPr txBox="1"/>
+          <p:nvPr/>
+        </p:nvSpPr>
+        <p:spPr>
+          <a:xfrm>
+            <a:off x="11383239" y="4248730"/>
+            <a:ext cx="1127485" cy="276999"/>
+          </a:xfrm>
+          <a:prstGeom prst="rect">
+            <a:avLst/>
+          </a:prstGeom>
+          <a:noFill/>
+        </p:spPr>
+        <p:txBody>
+          <a:bodyPr wrap="square" rtlCol="0">
+            <a:spAutoFit/>
+          </a:bodyPr>
+          <a:lstStyle/>
+          <a:p>
+            <a:pPr algn="ctr"/>
+            <a:r>
+              <a:rPr lang="fr-FR" sz="1200" dirty="0" smtClean="0"/>
+              <a:t>Vert</a:t>
+            </a:r>
+            <a:endParaRPr lang="fr-FR" sz="1200" dirty="0"/>
+          </a:p>
+        </p:txBody>
+      </p:sp>
+      <p:sp>
+        <p:nvSpPr>
+          <p:cNvPr id="76" name="ZoneTexte 75"/>
+          <p:cNvSpPr txBox="1"/>
+          <p:nvPr/>
+        </p:nvSpPr>
+        <p:spPr>
+          <a:xfrm>
+            <a:off x="11383239" y="4475803"/>
+            <a:ext cx="1137337" cy="276999"/>
+          </a:xfrm>
+          <a:prstGeom prst="rect">
+            <a:avLst/>
+          </a:prstGeom>
+          <a:noFill/>
+        </p:spPr>
+        <p:txBody>
+          <a:bodyPr wrap="square" rtlCol="0">
+            <a:spAutoFit/>
+          </a:bodyPr>
+          <a:lstStyle/>
+          <a:p>
+            <a:pPr algn="ctr"/>
+            <a:r>
+              <a:rPr lang="fr-FR" sz="1200" dirty="0" smtClean="0"/>
+              <a:t>Bleu</a:t>
+            </a:r>
+            <a:endParaRPr lang="fr-FR" sz="1200" dirty="0"/>
+          </a:p>
+        </p:txBody>
+      </p:sp>
+      <p:cxnSp>
+        <p:nvCxnSpPr>
+          <p:cNvPr id="77" name="Connecteur droit avec flèche 76"/>
+          <p:cNvCxnSpPr/>
+          <p:nvPr/>
+        </p:nvCxnSpPr>
+        <p:spPr>
+          <a:xfrm>
+            <a:off x="11388656" y="4237830"/>
+            <a:ext cx="1122069" cy="1246"/>
+          </a:xfrm>
+          <a:prstGeom prst="straightConnector1">
+            <a:avLst/>
+          </a:prstGeom>
+          <a:ln w="38100">
+            <a:solidFill>
+              <a:srgbClr val="FF0000"/>
+            </a:solidFill>
+            <a:tailEnd type="triangle"/>
+          </a:ln>
+        </p:spPr>
+        <p:style>
+          <a:lnRef idx="1">
+            <a:schemeClr val="accent1"/>
+          </a:lnRef>
+          <a:fillRef idx="0">
+            <a:schemeClr val="accent1"/>
+          </a:fillRef>
+          <a:effectRef idx="0">
+            <a:schemeClr val="accent1"/>
+          </a:effectRef>
+          <a:fontRef idx="minor">
+            <a:schemeClr val="tx1"/>
+          </a:fontRef>
+        </p:style>
+      </p:cxnSp>
+      <p:cxnSp>
+        <p:nvCxnSpPr>
+          <p:cNvPr id="78" name="Connecteur droit avec flèche 77"/>
+          <p:cNvCxnSpPr/>
+          <p:nvPr/>
+        </p:nvCxnSpPr>
+        <p:spPr>
+          <a:xfrm>
+            <a:off x="11387676" y="4740639"/>
+            <a:ext cx="1128465" cy="1857"/>
+          </a:xfrm>
+          <a:prstGeom prst="straightConnector1">
+            <a:avLst/>
+          </a:prstGeom>
+          <a:ln w="38100">
+            <a:tailEnd type="triangle"/>
+          </a:ln>
+        </p:spPr>
+        <p:style>
+          <a:lnRef idx="1">
+            <a:schemeClr val="accent1"/>
+          </a:lnRef>
+          <a:fillRef idx="0">
+            <a:schemeClr val="accent1"/>
+          </a:fillRef>
+          <a:effectRef idx="0">
+            <a:schemeClr val="accent1"/>
+          </a:effectRef>
+          <a:fontRef idx="minor">
+            <a:schemeClr val="tx1"/>
+          </a:fontRef>
+        </p:style>
+      </p:cxnSp>
+      <p:cxnSp>
+        <p:nvCxnSpPr>
+          <p:cNvPr id="79" name="Connecteur en angle 78"/>
+          <p:cNvCxnSpPr>
+            <a:stCxn id="11" idx="1"/>
+            <a:endCxn id="67" idx="2"/>
+          </p:cNvCxnSpPr>
+          <p:nvPr/>
+        </p:nvCxnSpPr>
+        <p:spPr>
+          <a:xfrm rot="10800000" flipH="1" flipV="1">
+            <a:off x="3456208" y="4455532"/>
+            <a:ext cx="6952697" cy="547736"/>
+          </a:xfrm>
+          <a:prstGeom prst="bentConnector4">
+            <a:avLst>
+              <a:gd name="adj1" fmla="val -3288"/>
+              <a:gd name="adj2" fmla="val 141735"/>
+            </a:avLst>
+          </a:prstGeom>
+          <a:ln w="38100">
+            <a:solidFill>
+              <a:schemeClr val="accent4"/>
+            </a:solidFill>
+            <a:tailEnd type="triangle"/>
+          </a:ln>
+        </p:spPr>
+        <p:style>
+          <a:lnRef idx="1">
+            <a:schemeClr val="accent1"/>
+          </a:lnRef>
+          <a:fillRef idx="0">
+            <a:schemeClr val="accent1"/>
+          </a:fillRef>
+          <a:effectRef idx="0">
+            <a:schemeClr val="accent1"/>
+          </a:effectRef>
+          <a:fontRef idx="minor">
+            <a:schemeClr val="tx1"/>
+          </a:fontRef>
+        </p:style>
+      </p:cxnSp>
+      <p:cxnSp>
+        <p:nvCxnSpPr>
+          <p:cNvPr id="82" name="Connecteur en angle 81"/>
+          <p:cNvCxnSpPr>
+            <a:stCxn id="55" idx="0"/>
+            <a:endCxn id="67" idx="0"/>
+          </p:cNvCxnSpPr>
+          <p:nvPr/>
+        </p:nvCxnSpPr>
+        <p:spPr>
+          <a:xfrm rot="16200000" flipH="1">
+            <a:off x="8859870" y="2426181"/>
+            <a:ext cx="5661" cy="3092409"/>
+          </a:xfrm>
+          <a:prstGeom prst="bentConnector3">
+            <a:avLst>
+              <a:gd name="adj1" fmla="val -5594524"/>
+            </a:avLst>
+          </a:prstGeom>
+          <a:ln w="38100">
+            <a:solidFill>
+              <a:schemeClr val="tx1"/>
+            </a:solidFill>
+            <a:tailEnd type="triangle"/>
+          </a:ln>
+        </p:spPr>
+        <p:style>
+          <a:lnRef idx="1">
+            <a:schemeClr val="accent1"/>
+          </a:lnRef>
+          <a:fillRef idx="0">
+            <a:schemeClr val="accent1"/>
+          </a:fillRef>
+          <a:effectRef idx="0">
+            <a:schemeClr val="accent1"/>
+          </a:effectRef>
+          <a:fontRef idx="minor">
+            <a:schemeClr val="tx1"/>
+          </a:fontRef>
+        </p:style>
+      </p:cxnSp>
+      <p:cxnSp>
+        <p:nvCxnSpPr>
+          <p:cNvPr id="108" name="Connecteur droit avec flèche 107"/>
+          <p:cNvCxnSpPr/>
+          <p:nvPr/>
+        </p:nvCxnSpPr>
+        <p:spPr>
+          <a:xfrm flipV="1">
+            <a:off x="9815513" y="5008930"/>
+            <a:ext cx="4763" cy="481412"/>
+          </a:xfrm>
+          <a:prstGeom prst="straightConnector1">
+            <a:avLst/>
+          </a:prstGeom>
+          <a:ln w="38100">
+            <a:solidFill>
+              <a:srgbClr val="7030A0"/>
+            </a:solidFill>
+            <a:tailEnd type="triangle"/>
+          </a:ln>
+        </p:spPr>
+        <p:style>
+          <a:lnRef idx="1">
+            <a:schemeClr val="accent1"/>
+          </a:lnRef>
+          <a:fillRef idx="0">
+            <a:schemeClr val="accent1"/>
+          </a:fillRef>
+          <a:effectRef idx="0">
+            <a:schemeClr val="accent1"/>
+          </a:effectRef>
+          <a:fontRef idx="minor">
+            <a:schemeClr val="tx1"/>
+          </a:fontRef>
+        </p:style>
+      </p:cxnSp>
+      <p:cxnSp>
+        <p:nvCxnSpPr>
+          <p:cNvPr id="113" name="Connecteur droit avec flèche 112"/>
+          <p:cNvCxnSpPr/>
+          <p:nvPr/>
+        </p:nvCxnSpPr>
+        <p:spPr>
+          <a:xfrm flipV="1">
+            <a:off x="11003702" y="5006331"/>
+            <a:ext cx="4763" cy="481412"/>
+          </a:xfrm>
+          <a:prstGeom prst="straightConnector1">
+            <a:avLst/>
+          </a:prstGeom>
+          <a:ln w="38100">
+            <a:solidFill>
+              <a:srgbClr val="7030A0"/>
+            </a:solidFill>
+            <a:tailEnd type="triangle"/>
+          </a:ln>
+        </p:spPr>
+        <p:style>
+          <a:lnRef idx="1">
+            <a:schemeClr val="accent1"/>
+          </a:lnRef>
+          <a:fillRef idx="0">
+            <a:schemeClr val="accent1"/>
+          </a:fillRef>
+          <a:effectRef idx="0">
+            <a:schemeClr val="accent1"/>
+          </a:effectRef>
+          <a:fontRef idx="minor">
+            <a:schemeClr val="tx1"/>
+          </a:fontRef>
+        </p:style>
+      </p:cxnSp>
+      <p:sp>
+        <p:nvSpPr>
+          <p:cNvPr id="114" name="ZoneTexte 113"/>
+          <p:cNvSpPr txBox="1"/>
+          <p:nvPr/>
+        </p:nvSpPr>
+        <p:spPr>
+          <a:xfrm>
+            <a:off x="9385513" y="5466001"/>
+            <a:ext cx="865477" cy="276999"/>
+          </a:xfrm>
+          <a:prstGeom prst="rect">
+            <a:avLst/>
+          </a:prstGeom>
+          <a:noFill/>
+        </p:spPr>
+        <p:txBody>
+          <a:bodyPr wrap="square" rtlCol="0">
+            <a:spAutoFit/>
+          </a:bodyPr>
+          <a:lstStyle/>
+          <a:p>
+            <a:pPr algn="ctr"/>
+            <a:r>
+              <a:rPr lang="fr-FR" sz="1200" dirty="0" smtClean="0"/>
+              <a:t>Position_H</a:t>
+            </a:r>
+            <a:endParaRPr lang="fr-FR" sz="1200" dirty="0"/>
+          </a:p>
+        </p:txBody>
+      </p:sp>
+      <p:sp>
+        <p:nvSpPr>
+          <p:cNvPr id="115" name="ZoneTexte 114"/>
+          <p:cNvSpPr txBox="1"/>
+          <p:nvPr/>
+        </p:nvSpPr>
+        <p:spPr>
+          <a:xfrm>
+            <a:off x="10548583" y="5466001"/>
+            <a:ext cx="910238" cy="276999"/>
+          </a:xfrm>
+          <a:prstGeom prst="rect">
+            <a:avLst/>
+          </a:prstGeom>
+          <a:noFill/>
+        </p:spPr>
+        <p:txBody>
+          <a:bodyPr wrap="square" rtlCol="0">
+            <a:spAutoFit/>
+          </a:bodyPr>
+          <a:lstStyle/>
+          <a:p>
+            <a:pPr algn="ctr"/>
+            <a:r>
+              <a:rPr lang="fr-FR" sz="1200" dirty="0" smtClean="0"/>
+              <a:t>Position_V</a:t>
+            </a:r>
+            <a:endParaRPr lang="fr-FR" sz="1200" dirty="0"/>
+          </a:p>
+        </p:txBody>
+      </p:sp>
+      <p:pic>
+        <p:nvPicPr>
+          <p:cNvPr id="130" name="Image 129"/>
+          <p:cNvPicPr>
+            <a:picLocks noChangeAspect="1"/>
+          </p:cNvPicPr>
+          <p:nvPr/>
+        </p:nvPicPr>
+        <p:blipFill>
+          <a:blip r:embed="rId4"/>
+          <a:stretch>
+            <a:fillRect/>
+          </a:stretch>
+        </p:blipFill>
+        <p:spPr>
+          <a:xfrm>
+            <a:off x="12795426" y="1398982"/>
+            <a:ext cx="2303333" cy="1316974"/>
+          </a:xfrm>
+          <a:prstGeom prst="rect">
+            <a:avLst/>
+          </a:prstGeom>
+          <a:effectLst>
+            <a:softEdge rad="127000"/>
+          </a:effectLst>
+        </p:spPr>
+      </p:pic>
+      <p:sp>
+        <p:nvSpPr>
+          <p:cNvPr id="131" name="ZoneTexte 130"/>
+          <p:cNvSpPr txBox="1"/>
+          <p:nvPr/>
+        </p:nvSpPr>
+        <p:spPr>
+          <a:xfrm>
+            <a:off x="12651698" y="1110472"/>
+            <a:ext cx="2638269" cy="369332"/>
+          </a:xfrm>
+          <a:prstGeom prst="rect">
+            <a:avLst/>
+          </a:prstGeom>
+          <a:noFill/>
+        </p:spPr>
+        <p:txBody>
+          <a:bodyPr wrap="square" rtlCol="0">
+            <a:spAutoFit/>
+          </a:bodyPr>
+          <a:lstStyle/>
+          <a:p>
+            <a:pPr algn="ctr"/>
+            <a:r>
+              <a:rPr lang="fr-FR" dirty="0" smtClean="0"/>
+              <a:t>Patern </a:t>
+            </a:r>
+            <a:r>
+              <a:rPr lang="fr-FR" dirty="0" smtClean="0"/>
+              <a:t>+ filtre de Gausse</a:t>
+            </a:r>
+            <a:endParaRPr lang="fr-FR" dirty="0"/>
+          </a:p>
+        </p:txBody>
+      </p:sp>
+    </p:spTree>
+    <p:extLst>
+      <p:ext uri="{BB962C8B-B14F-4D97-AF65-F5344CB8AC3E}">
+        <p14:creationId xmlns:p14="http://schemas.microsoft.com/office/powerpoint/2010/main" val="611143239"/>
+      </p:ext>
+    </p:extLst>
+  </p:cSld>
+  <p:clrMapOvr>
+    <a:masterClrMapping/>
+  </p:clrMapOvr>
+</p:sld>
+</file>
+
+<file path=ppt/slides/slide4.xml><?xml version="1.0" encoding="utf-8"?>
+<p:sld xmlns:a="http://schemas.openxmlformats.org/drawingml/2006/main" xmlns:r="http://schemas.openxmlformats.org/officeDocument/2006/relationships" xmlns:p="http://schemas.openxmlformats.org/presentationml/2006/main">
+  <p:cSld>
+    <p:spTree>
+      <p:nvGrpSpPr>
+        <p:cNvPr id="1" name=""/>
+        <p:cNvGrpSpPr/>
+        <p:nvPr/>
+      </p:nvGrpSpPr>
+      <p:grpSpPr>
+        <a:xfrm>
+          <a:off x="0" y="0"/>
+          <a:ext cx="0" cy="0"/>
+          <a:chOff x="0" y="0"/>
+          <a:chExt cx="0" cy="0"/>
+        </a:xfrm>
+      </p:grpSpPr>
+      <p:pic>
+        <p:nvPicPr>
           <p:cNvPr id="4" name="Image 3"/>
           <p:cNvPicPr>
             <a:picLocks noChangeAspect="1"/>
@@ -6463,7 +8592,7 @@
 </p:sld>
 </file>
 
-<file path=ppt/slides/slide4.xml><?xml version="1.0" encoding="utf-8"?>
+<file path=ppt/slides/slide5.xml><?xml version="1.0" encoding="utf-8"?>
 <p:sld xmlns:a="http://schemas.openxmlformats.org/drawingml/2006/main" xmlns:r="http://schemas.openxmlformats.org/officeDocument/2006/relationships" xmlns:p="http://schemas.openxmlformats.org/presentationml/2006/main">
   <p:cSld>
     <p:spTree>

</xml_diff>